<commit_message>
added some 1227 for smu
</commit_message>
<xml_diff>
--- a/RestSample/java-docs/java2a/java-advance-section-6-database.pptx
+++ b/RestSample/java-docs/java2a/java-advance-section-6-database.pptx
@@ -3173,11 +3173,7 @@
             <a:pPr lvl="1" algn="l"/>
             <a:r>
               <a:rPr lang="en-US" altLang="zh-CN" sz="1800" dirty="0" smtClean="0"/>
-              <a:t>4.JAXB,</a:t>
-            </a:r>
-            <a:r>
-              <a:rPr lang="en-US" altLang="zh-CN" sz="1800" dirty="0" smtClean="0"/>
-              <a:t>xml</a:t>
+              <a:t>4.JAXB,xml</a:t>
             </a:r>
             <a:r>
               <a:rPr lang="zh-CN" altLang="en-US" sz="1800" dirty="0" smtClean="0"/>
@@ -3220,7 +3216,7 @@
               <a:t>java</a:t>
             </a:r>
             <a:r>
-              <a:rPr lang="zh-CN" altLang="en-US" sz="1800" smtClean="0"/>
+              <a:rPr lang="zh-CN" altLang="en-US" sz="1800" dirty="0" smtClean="0"/>
               <a:t>对象的互换</a:t>
             </a:r>
             <a:endParaRPr lang="en-US" altLang="zh-CN" sz="1800" dirty="0" smtClean="0"/>

</xml_diff>